<commit_message>
Speaker notes en verborgen dia's verwijderd
</commit_message>
<xml_diff>
--- a/static/documents/20250422-introductie-voor-inloopspreekuur.pptx
+++ b/static/documents/20250422-introductie-voor-inloopspreekuur.pptx
@@ -1643,7 +1643,7 @@
           <a:p>
             <a:fld id="{BB30DC13-A57A-5A4A-ABAE-37CFB22F1FF1}" type="datetimeFigureOut">
               <a:rPr lang="nl-NL" smtClean="0"/>
-              <a:t>21-04-2025</a:t>
+              <a:t>22-06-2025</a:t>
             </a:fld>
             <a:endParaRPr lang="nl-NL"/>
           </a:p>
@@ -1820,7 +1820,7 @@
           <a:p>
             <a:fld id="{83DBB16A-D929-554D-8D35-A358C3C5D94F}" type="datetimeFigureOut">
               <a:rPr lang="nl-NL" smtClean="0"/>
-              <a:t>21-04-2025</a:t>
+              <a:t>22-06-2025</a:t>
             </a:fld>
             <a:endParaRPr lang="nl-NL"/>
           </a:p>
@@ -3417,33 +3417,7 @@
           <a:bodyPr/>
           <a:lstStyle/>
           <a:p>
-            <a:r>
-              <a:rPr lang="nl-NL"/>
-              <a:t>Zie </a:t>
-            </a:r>
-            <a:r>
-              <a:rPr lang="nl-NL" err="1"/>
-              <a:t>hidden</a:t>
-            </a:r>
-            <a:r>
-              <a:rPr lang="nl-NL"/>
-              <a:t> slide 6</a:t>
-            </a:r>
-            <a:br>
-              <a:rPr lang="nl-NL"/>
-            </a:br>
-            <a:r>
-              <a:rPr lang="nl-NL"/>
-              <a:t>PEP hoort bij EAM, maar zit in de praktijk in de applicatie….. Zit ’ernaast’ naast de applicatie…. Vandaar </a:t>
-            </a:r>
-            <a:r>
-              <a:rPr lang="nl-NL" err="1"/>
-              <a:t>gradient</a:t>
-            </a:r>
-            <a:r>
-              <a:rPr lang="nl-NL"/>
-              <a:t>….</a:t>
-            </a:r>
+            <a:endParaRPr lang="nl-NL" dirty="0"/>
           </a:p>
         </p:txBody>
       </p:sp>
@@ -5121,7 +5095,7 @@
           <a:p>
             <a:fld id="{143A6A95-3FD8-9C48-85AA-6FECB852C84D}" type="datetimeFigureOut">
               <a:rPr lang="nl-NL" smtClean="0"/>
-              <a:t>21-04-2025</a:t>
+              <a:t>22-06-2025</a:t>
             </a:fld>
             <a:endParaRPr lang="nl-NL"/>
           </a:p>
@@ -5262,7 +5236,7 @@
           <a:p>
             <a:fld id="{143A6A95-3FD8-9C48-85AA-6FECB852C84D}" type="datetimeFigureOut">
               <a:rPr lang="nl-NL" smtClean="0"/>
-              <a:t>21-04-2025</a:t>
+              <a:t>22-06-2025</a:t>
             </a:fld>
             <a:endParaRPr lang="nl-NL"/>
           </a:p>
@@ -5375,7 +5349,7 @@
           <a:p>
             <a:fld id="{143A6A95-3FD8-9C48-85AA-6FECB852C84D}" type="datetimeFigureOut">
               <a:rPr lang="nl-NL" smtClean="0"/>
-              <a:t>21-04-2025</a:t>
+              <a:t>22-06-2025</a:t>
             </a:fld>
             <a:endParaRPr lang="nl-NL"/>
           </a:p>
@@ -5686,7 +5660,7 @@
           <a:p>
             <a:fld id="{143A6A95-3FD8-9C48-85AA-6FECB852C84D}" type="datetimeFigureOut">
               <a:rPr lang="nl-NL" smtClean="0"/>
-              <a:t>21-04-2025</a:t>
+              <a:t>22-06-2025</a:t>
             </a:fld>
             <a:endParaRPr lang="nl-NL"/>
           </a:p>
@@ -5974,7 +5948,7 @@
           <a:p>
             <a:fld id="{143A6A95-3FD8-9C48-85AA-6FECB852C84D}" type="datetimeFigureOut">
               <a:rPr lang="nl-NL" smtClean="0"/>
-              <a:t>21-04-2025</a:t>
+              <a:t>22-06-2025</a:t>
             </a:fld>
             <a:endParaRPr lang="nl-NL"/>
           </a:p>
@@ -6298,7 +6272,7 @@
           <a:p>
             <a:fld id="{143A6A95-3FD8-9C48-85AA-6FECB852C84D}" type="datetimeFigureOut">
               <a:rPr lang="nl-NL" smtClean="0"/>
-              <a:t>21-04-2025</a:t>
+              <a:t>22-06-2025</a:t>
             </a:fld>
             <a:endParaRPr lang="nl-NL"/>
           </a:p>
@@ -6650,7 +6624,7 @@
           <a:p>
             <a:fld id="{143A6A95-3FD8-9C48-85AA-6FECB852C84D}" type="datetimeFigureOut">
               <a:rPr lang="nl-NL" smtClean="0"/>
-              <a:t>21-04-2025</a:t>
+              <a:t>22-06-2025</a:t>
             </a:fld>
             <a:endParaRPr lang="nl-NL"/>
           </a:p>
@@ -6848,7 +6822,7 @@
           <a:p>
             <a:fld id="{143A6A95-3FD8-9C48-85AA-6FECB852C84D}" type="datetimeFigureOut">
               <a:rPr lang="nl-NL" smtClean="0"/>
-              <a:t>21-04-2025</a:t>
+              <a:t>22-06-2025</a:t>
             </a:fld>
             <a:endParaRPr lang="nl-NL"/>
           </a:p>
@@ -7056,7 +7030,7 @@
           <a:p>
             <a:fld id="{143A6A95-3FD8-9C48-85AA-6FECB852C84D}" type="datetimeFigureOut">
               <a:rPr lang="nl-NL" smtClean="0"/>
-              <a:t>21-04-2025</a:t>
+              <a:t>22-06-2025</a:t>
             </a:fld>
             <a:endParaRPr lang="nl-NL"/>
           </a:p>
@@ -7285,7 +7259,7 @@
           <a:p>
             <a:fld id="{143A6A95-3FD8-9C48-85AA-6FECB852C84D}" type="datetimeFigureOut">
               <a:rPr lang="nl-NL" smtClean="0"/>
-              <a:t>21-04-2025</a:t>
+              <a:t>22-06-2025</a:t>
             </a:fld>
             <a:endParaRPr lang="nl-NL"/>
           </a:p>
@@ -7499,7 +7473,7 @@
           <a:p>
             <a:fld id="{143A6A95-3FD8-9C48-85AA-6FECB852C84D}" type="datetimeFigureOut">
               <a:rPr lang="nl-NL" smtClean="0"/>
-              <a:t>21-04-2025</a:t>
+              <a:t>22-06-2025</a:t>
             </a:fld>
             <a:endParaRPr lang="nl-NL"/>
           </a:p>
@@ -7735,7 +7709,7 @@
           <a:p>
             <a:fld id="{143A6A95-3FD8-9C48-85AA-6FECB852C84D}" type="datetimeFigureOut">
               <a:rPr lang="nl-NL" smtClean="0"/>
-              <a:t>21-04-2025</a:t>
+              <a:t>22-06-2025</a:t>
             </a:fld>
             <a:endParaRPr lang="nl-NL"/>
           </a:p>
@@ -8044,7 +8018,7 @@
           <a:p>
             <a:fld id="{143A6A95-3FD8-9C48-85AA-6FECB852C84D}" type="datetimeFigureOut">
               <a:rPr lang="nl-NL" smtClean="0"/>
-              <a:t>21-04-2025</a:t>
+              <a:t>22-06-2025</a:t>
             </a:fld>
             <a:endParaRPr lang="nl-NL"/>
           </a:p>
@@ -8373,7 +8347,7 @@
           <a:p>
             <a:fld id="{143A6A95-3FD8-9C48-85AA-6FECB852C84D}" type="datetimeFigureOut">
               <a:rPr lang="nl-NL" smtClean="0"/>
-              <a:t>21-04-2025</a:t>
+              <a:t>22-06-2025</a:t>
             </a:fld>
             <a:endParaRPr lang="nl-NL"/>
           </a:p>
@@ -8702,7 +8676,7 @@
           <a:p>
             <a:fld id="{143A6A95-3FD8-9C48-85AA-6FECB852C84D}" type="datetimeFigureOut">
               <a:rPr lang="nl-NL" smtClean="0"/>
-              <a:t>21-04-2025</a:t>
+              <a:t>22-06-2025</a:t>
             </a:fld>
             <a:endParaRPr lang="nl-NL"/>
           </a:p>
@@ -8967,7 +8941,7 @@
           <a:p>
             <a:fld id="{143A6A95-3FD8-9C48-85AA-6FECB852C84D}" type="datetimeFigureOut">
               <a:rPr lang="nl-NL" smtClean="0"/>
-              <a:t>21-04-2025</a:t>
+              <a:t>22-06-2025</a:t>
             </a:fld>
             <a:endParaRPr lang="nl-NL"/>
           </a:p>
@@ -9379,7 +9353,7 @@
           <a:p>
             <a:fld id="{143A6A95-3FD8-9C48-85AA-6FECB852C84D}" type="datetimeFigureOut">
               <a:rPr lang="nl-NL" smtClean="0"/>
-              <a:t>21-04-2025</a:t>
+              <a:t>22-06-2025</a:t>
             </a:fld>
             <a:endParaRPr lang="nl-NL"/>
           </a:p>
@@ -9722,7 +9696,7 @@
             <a:fld id="{143A6A95-3FD8-9C48-85AA-6FECB852C84D}" type="datetimeFigureOut">
               <a:rPr lang="nl-NL" smtClean="0"/>
               <a:pPr/>
-              <a:t>21-04-2025</a:t>
+              <a:t>22-06-2025</a:t>
             </a:fld>
             <a:endParaRPr lang="nl-NL"/>
           </a:p>
@@ -38848,6 +38822,15 @@
 </file>
 
 <file path=customXml/item1.xml><?xml version="1.0" encoding="utf-8"?>
+<?mso-contentType ?>
+<FormTemplates xmlns="http://schemas.microsoft.com/sharepoint/v3/contenttype/forms">
+  <Display>DocumentLibraryForm</Display>
+  <Edit>DocumentLibraryForm</Edit>
+  <New>DocumentLibraryForm</New>
+</FormTemplates>
+</file>
+
+<file path=customXml/item2.xml><?xml version="1.0" encoding="utf-8"?>
 <p:properties xmlns:p="http://schemas.microsoft.com/office/2006/metadata/properties" xmlns:xsi="http://www.w3.org/2001/XMLSchema-instance" xmlns:pc="http://schemas.microsoft.com/office/infopath/2007/PartnerControls">
   <documentManagement>
     <lcf76f155ced4ddcb4097134ff3c332f xmlns="51e72e7f-3f03-4b36-939e-4e1d8b546757">
@@ -38856,15 +38839,6 @@
     <TaxCatchAll xmlns="c9fd5ebf-977d-42d6-9a97-5a76dcb1d273" xsi:nil="true"/>
   </documentManagement>
 </p:properties>
-</file>
-
-<file path=customXml/item2.xml><?xml version="1.0" encoding="utf-8"?>
-<?mso-contentType ?>
-<FormTemplates xmlns="http://schemas.microsoft.com/sharepoint/v3/contenttype/forms">
-  <Display>DocumentLibraryForm</Display>
-  <Edit>DocumentLibraryForm</Edit>
-  <New>DocumentLibraryForm</New>
-</FormTemplates>
 </file>
 
 <file path=customXml/item3.xml><?xml version="1.0" encoding="utf-8"?>
@@ -39097,6 +39071,14 @@
 </file>
 
 <file path=customXml/itemProps1.xml><?xml version="1.0" encoding="utf-8"?>
+<ds:datastoreItem xmlns:ds="http://schemas.openxmlformats.org/officeDocument/2006/customXml" ds:itemID="{35C96209-935C-42A4-BF93-7954D93E5542}">
+  <ds:schemaRefs>
+    <ds:schemaRef ds:uri="http://schemas.microsoft.com/sharepoint/v3/contenttype/forms"/>
+  </ds:schemaRefs>
+</ds:datastoreItem>
+</file>
+
+<file path=customXml/itemProps2.xml><?xml version="1.0" encoding="utf-8"?>
 <ds:datastoreItem xmlns:ds="http://schemas.openxmlformats.org/officeDocument/2006/customXml" ds:itemID="{37363BAD-171A-4753-9653-90EF2FFCD3CC}">
   <ds:schemaRefs>
     <ds:schemaRef ds:uri="http://purl.org/dc/dcmitype/"/>
@@ -39109,14 +39091,6 @@
     <ds:schemaRef ds:uri="http://schemas.microsoft.com/office/infopath/2007/PartnerControls"/>
     <ds:schemaRef ds:uri="http://schemas.openxmlformats.org/package/2006/metadata/core-properties"/>
     <ds:schemaRef ds:uri="51e72e7f-3f03-4b36-939e-4e1d8b546757"/>
-  </ds:schemaRefs>
-</ds:datastoreItem>
-</file>
-
-<file path=customXml/itemProps2.xml><?xml version="1.0" encoding="utf-8"?>
-<ds:datastoreItem xmlns:ds="http://schemas.openxmlformats.org/officeDocument/2006/customXml" ds:itemID="{35C96209-935C-42A4-BF93-7954D93E5542}">
-  <ds:schemaRefs>
-    <ds:schemaRef ds:uri="http://schemas.microsoft.com/sharepoint/v3/contenttype/forms"/>
   </ds:schemaRefs>
 </ds:datastoreItem>
 </file>

</xml_diff>